<commit_message>
.git/COMMIT_EDITMSG [unix] (19:08 09/01/2025)                                                                                                                                                       1,0-1 Top "/Power-BI/.git/COMMIT_EDITMSG" [unix] 29L, 2289B                                                                                                                                                           m
</commit_message>
<xml_diff>
--- a/Criando um Relatório Vendas e Lucros com Data Analitcs/Paineis/Criando um elatóio Vendas e lucros com Data Analitics.pptx
+++ b/Criando um Relatório Vendas e Lucros com Data Analitcs/Paineis/Criando um elatóio Vendas e lucros com Data Analitics.pptx
@@ -200,7 +200,7 @@
           <a:p>
             <a:fld id="{1B9B11F9-E227-4D57-813B-A58171BBE71E}" type="datetimeFigureOut">
               <a:rPr lang="pt-BR" smtClean="0"/>
-              <a:t>22/09/2024</a:t>
+              <a:t>06/01/2025</a:t>
             </a:fld>
             <a:endParaRPr lang="pt-BR"/>
           </a:p>
@@ -596,7 +596,7 @@
           <a:p>
             <a:fld id="{0E69D9FF-5D3A-47B1-967B-F72A1984A174}" type="datetimeFigureOut">
               <a:rPr lang="pt-BR" smtClean="0"/>
-              <a:t>22/09/2024</a:t>
+              <a:t>06/01/2025</a:t>
             </a:fld>
             <a:endParaRPr lang="pt-BR"/>
           </a:p>
@@ -764,7 +764,7 @@
           <a:p>
             <a:fld id="{0E69D9FF-5D3A-47B1-967B-F72A1984A174}" type="datetimeFigureOut">
               <a:rPr lang="pt-BR" smtClean="0"/>
-              <a:t>22/09/2024</a:t>
+              <a:t>06/01/2025</a:t>
             </a:fld>
             <a:endParaRPr lang="pt-BR"/>
           </a:p>
@@ -942,7 +942,7 @@
           <a:p>
             <a:fld id="{0E69D9FF-5D3A-47B1-967B-F72A1984A174}" type="datetimeFigureOut">
               <a:rPr lang="pt-BR" smtClean="0"/>
-              <a:t>22/09/2024</a:t>
+              <a:t>06/01/2025</a:t>
             </a:fld>
             <a:endParaRPr lang="pt-BR"/>
           </a:p>
@@ -1110,7 +1110,7 @@
           <a:p>
             <a:fld id="{0E69D9FF-5D3A-47B1-967B-F72A1984A174}" type="datetimeFigureOut">
               <a:rPr lang="pt-BR" smtClean="0"/>
-              <a:t>22/09/2024</a:t>
+              <a:t>06/01/2025</a:t>
             </a:fld>
             <a:endParaRPr lang="pt-BR"/>
           </a:p>
@@ -1355,7 +1355,7 @@
           <a:p>
             <a:fld id="{0E69D9FF-5D3A-47B1-967B-F72A1984A174}" type="datetimeFigureOut">
               <a:rPr lang="pt-BR" smtClean="0"/>
-              <a:t>22/09/2024</a:t>
+              <a:t>06/01/2025</a:t>
             </a:fld>
             <a:endParaRPr lang="pt-BR"/>
           </a:p>
@@ -1584,7 +1584,7 @@
           <a:p>
             <a:fld id="{0E69D9FF-5D3A-47B1-967B-F72A1984A174}" type="datetimeFigureOut">
               <a:rPr lang="pt-BR" smtClean="0"/>
-              <a:t>22/09/2024</a:t>
+              <a:t>06/01/2025</a:t>
             </a:fld>
             <a:endParaRPr lang="pt-BR"/>
           </a:p>
@@ -1948,7 +1948,7 @@
           <a:p>
             <a:fld id="{0E69D9FF-5D3A-47B1-967B-F72A1984A174}" type="datetimeFigureOut">
               <a:rPr lang="pt-BR" smtClean="0"/>
-              <a:t>22/09/2024</a:t>
+              <a:t>06/01/2025</a:t>
             </a:fld>
             <a:endParaRPr lang="pt-BR"/>
           </a:p>
@@ -2065,7 +2065,7 @@
           <a:p>
             <a:fld id="{0E69D9FF-5D3A-47B1-967B-F72A1984A174}" type="datetimeFigureOut">
               <a:rPr lang="pt-BR" smtClean="0"/>
-              <a:t>22/09/2024</a:t>
+              <a:t>06/01/2025</a:t>
             </a:fld>
             <a:endParaRPr lang="pt-BR"/>
           </a:p>
@@ -2160,7 +2160,7 @@
           <a:p>
             <a:fld id="{0E69D9FF-5D3A-47B1-967B-F72A1984A174}" type="datetimeFigureOut">
               <a:rPr lang="pt-BR" smtClean="0"/>
-              <a:t>22/09/2024</a:t>
+              <a:t>06/01/2025</a:t>
             </a:fld>
             <a:endParaRPr lang="pt-BR"/>
           </a:p>
@@ -2435,7 +2435,7 @@
           <a:p>
             <a:fld id="{0E69D9FF-5D3A-47B1-967B-F72A1984A174}" type="datetimeFigureOut">
               <a:rPr lang="pt-BR" smtClean="0"/>
-              <a:t>22/09/2024</a:t>
+              <a:t>06/01/2025</a:t>
             </a:fld>
             <a:endParaRPr lang="pt-BR"/>
           </a:p>
@@ -2687,7 +2687,7 @@
           <a:p>
             <a:fld id="{0E69D9FF-5D3A-47B1-967B-F72A1984A174}" type="datetimeFigureOut">
               <a:rPr lang="pt-BR" smtClean="0"/>
-              <a:t>22/09/2024</a:t>
+              <a:t>06/01/2025</a:t>
             </a:fld>
             <a:endParaRPr lang="pt-BR"/>
           </a:p>
@@ -2898,7 +2898,7 @@
           <a:p>
             <a:fld id="{0E69D9FF-5D3A-47B1-967B-F72A1984A174}" type="datetimeFigureOut">
               <a:rPr lang="pt-BR" smtClean="0"/>
-              <a:t>22/09/2024</a:t>
+              <a:t>06/01/2025</a:t>
             </a:fld>
             <a:endParaRPr lang="pt-BR"/>
           </a:p>
@@ -3419,7 +3419,7 @@
         </p:nvSpPr>
         <p:spPr>
           <a:xfrm>
-            <a:off x="820882" y="362139"/>
+            <a:off x="820882" y="268196"/>
             <a:ext cx="11128663" cy="1788779"/>
           </a:xfrm>
           <a:prstGeom prst="roundRect">
@@ -3475,8 +3475,8 @@
         </p:nvSpPr>
         <p:spPr>
           <a:xfrm>
-            <a:off x="959667" y="452671"/>
-            <a:ext cx="1457608" cy="369332"/>
+            <a:off x="959666" y="452671"/>
+            <a:ext cx="2154725" cy="369332"/>
           </a:xfrm>
           <a:prstGeom prst="rect">
             <a:avLst/>
@@ -3491,7 +3491,7 @@
           <a:p>
             <a:r>
               <a:rPr lang="pt-BR" b="1" dirty="0"/>
-              <a:t>Sales Report</a:t>
+              <a:t>Relatório de vendas</a:t>
             </a:r>
           </a:p>
         </p:txBody>
@@ -3513,7 +3513,7 @@
         <p:spPr>
           <a:xfrm>
             <a:off x="1059252" y="758632"/>
-            <a:ext cx="1167900" cy="0"/>
+            <a:ext cx="1883124" cy="0"/>
           </a:xfrm>
           <a:prstGeom prst="line">
             <a:avLst/>
@@ -3567,7 +3567,7 @@
         </p:blipFill>
         <p:spPr>
           <a:xfrm>
-            <a:off x="2046845" y="123767"/>
+            <a:off x="2725853" y="123767"/>
             <a:ext cx="1826025" cy="1027139"/>
           </a:xfrm>
           <a:prstGeom prst="rect">

</xml_diff>